<commit_message>
allow pieces to move
</commit_message>
<xml_diff>
--- a/images/design.pptx
+++ b/images/design.pptx
@@ -5,7 +5,7 @@
     <p:sldMasterId id="2147483648" r:id="rId1"/>
   </p:sldMasterIdLst>
   <p:notesMasterIdLst>
-    <p:notesMasterId r:id="rId10"/>
+    <p:notesMasterId r:id="rId11"/>
   </p:notesMasterIdLst>
   <p:sldIdLst>
     <p:sldId id="256" r:id="rId2"/>
@@ -16,6 +16,7 @@
     <p:sldId id="261" r:id="rId7"/>
     <p:sldId id="262" r:id="rId8"/>
     <p:sldId id="263" r:id="rId9"/>
+    <p:sldId id="264" r:id="rId10"/>
   </p:sldIdLst>
   <p:sldSz cx="12192000" cy="6858000"/>
   <p:notesSz cx="6858000" cy="9144000"/>
@@ -204,7 +205,7 @@
           <a:p>
             <a:fld id="{4C20BAA2-BD9B-485A-B03A-9B705EBC1C18}" type="datetimeFigureOut">
               <a:rPr lang="ko-KR" altLang="en-US" smtClean="0"/>
-              <a:t>2021-11-18</a:t>
+              <a:t>2021-11-19</a:t>
             </a:fld>
             <a:endParaRPr lang="ko-KR" altLang="en-US"/>
           </a:p>
@@ -702,7 +703,7 @@
           <a:p>
             <a:fld id="{C9C1371F-EFFD-428B-A2B4-E353846D2DA0}" type="datetimeFigureOut">
               <a:rPr lang="ko-KR" altLang="en-US" smtClean="0"/>
-              <a:t>2021-11-18</a:t>
+              <a:t>2021-11-19</a:t>
             </a:fld>
             <a:endParaRPr lang="ko-KR" altLang="en-US"/>
           </a:p>
@@ -900,7 +901,7 @@
           <a:p>
             <a:fld id="{C9C1371F-EFFD-428B-A2B4-E353846D2DA0}" type="datetimeFigureOut">
               <a:rPr lang="ko-KR" altLang="en-US" smtClean="0"/>
-              <a:t>2021-11-18</a:t>
+              <a:t>2021-11-19</a:t>
             </a:fld>
             <a:endParaRPr lang="ko-KR" altLang="en-US"/>
           </a:p>
@@ -1108,7 +1109,7 @@
           <a:p>
             <a:fld id="{C9C1371F-EFFD-428B-A2B4-E353846D2DA0}" type="datetimeFigureOut">
               <a:rPr lang="ko-KR" altLang="en-US" smtClean="0"/>
-              <a:t>2021-11-18</a:t>
+              <a:t>2021-11-19</a:t>
             </a:fld>
             <a:endParaRPr lang="ko-KR" altLang="en-US"/>
           </a:p>
@@ -1306,7 +1307,7 @@
           <a:p>
             <a:fld id="{C9C1371F-EFFD-428B-A2B4-E353846D2DA0}" type="datetimeFigureOut">
               <a:rPr lang="ko-KR" altLang="en-US" smtClean="0"/>
-              <a:t>2021-11-18</a:t>
+              <a:t>2021-11-19</a:t>
             </a:fld>
             <a:endParaRPr lang="ko-KR" altLang="en-US"/>
           </a:p>
@@ -1581,7 +1582,7 @@
           <a:p>
             <a:fld id="{C9C1371F-EFFD-428B-A2B4-E353846D2DA0}" type="datetimeFigureOut">
               <a:rPr lang="ko-KR" altLang="en-US" smtClean="0"/>
-              <a:t>2021-11-18</a:t>
+              <a:t>2021-11-19</a:t>
             </a:fld>
             <a:endParaRPr lang="ko-KR" altLang="en-US"/>
           </a:p>
@@ -1846,7 +1847,7 @@
           <a:p>
             <a:fld id="{C9C1371F-EFFD-428B-A2B4-E353846D2DA0}" type="datetimeFigureOut">
               <a:rPr lang="ko-KR" altLang="en-US" smtClean="0"/>
-              <a:t>2021-11-18</a:t>
+              <a:t>2021-11-19</a:t>
             </a:fld>
             <a:endParaRPr lang="ko-KR" altLang="en-US"/>
           </a:p>
@@ -2258,7 +2259,7 @@
           <a:p>
             <a:fld id="{C9C1371F-EFFD-428B-A2B4-E353846D2DA0}" type="datetimeFigureOut">
               <a:rPr lang="ko-KR" altLang="en-US" smtClean="0"/>
-              <a:t>2021-11-18</a:t>
+              <a:t>2021-11-19</a:t>
             </a:fld>
             <a:endParaRPr lang="ko-KR" altLang="en-US"/>
           </a:p>
@@ -2399,7 +2400,7 @@
           <a:p>
             <a:fld id="{C9C1371F-EFFD-428B-A2B4-E353846D2DA0}" type="datetimeFigureOut">
               <a:rPr lang="ko-KR" altLang="en-US" smtClean="0"/>
-              <a:t>2021-11-18</a:t>
+              <a:t>2021-11-19</a:t>
             </a:fld>
             <a:endParaRPr lang="ko-KR" altLang="en-US"/>
           </a:p>
@@ -2512,7 +2513,7 @@
           <a:p>
             <a:fld id="{C9C1371F-EFFD-428B-A2B4-E353846D2DA0}" type="datetimeFigureOut">
               <a:rPr lang="ko-KR" altLang="en-US" smtClean="0"/>
-              <a:t>2021-11-18</a:t>
+              <a:t>2021-11-19</a:t>
             </a:fld>
             <a:endParaRPr lang="ko-KR" altLang="en-US"/>
           </a:p>
@@ -2823,7 +2824,7 @@
           <a:p>
             <a:fld id="{C9C1371F-EFFD-428B-A2B4-E353846D2DA0}" type="datetimeFigureOut">
               <a:rPr lang="ko-KR" altLang="en-US" smtClean="0"/>
-              <a:t>2021-11-18</a:t>
+              <a:t>2021-11-19</a:t>
             </a:fld>
             <a:endParaRPr lang="ko-KR" altLang="en-US"/>
           </a:p>
@@ -3111,7 +3112,7 @@
           <a:p>
             <a:fld id="{C9C1371F-EFFD-428B-A2B4-E353846D2DA0}" type="datetimeFigureOut">
               <a:rPr lang="ko-KR" altLang="en-US" smtClean="0"/>
-              <a:t>2021-11-18</a:t>
+              <a:t>2021-11-19</a:t>
             </a:fld>
             <a:endParaRPr lang="ko-KR" altLang="en-US"/>
           </a:p>
@@ -3352,7 +3353,7 @@
           <a:p>
             <a:fld id="{C9C1371F-EFFD-428B-A2B4-E353846D2DA0}" type="datetimeFigureOut">
               <a:rPr lang="ko-KR" altLang="en-US" smtClean="0"/>
-              <a:t>2021-11-18</a:t>
+              <a:t>2021-11-19</a:t>
             </a:fld>
             <a:endParaRPr lang="ko-KR" altLang="en-US"/>
           </a:p>
@@ -13588,6 +13589,176 @@
 </p:sld>
 </file>
 
+<file path=ppt/slides/slide9.xml><?xml version="1.0" encoding="utf-8"?>
+<p:sld xmlns:a="http://schemas.openxmlformats.org/drawingml/2006/main" xmlns:r="http://schemas.openxmlformats.org/officeDocument/2006/relationships" xmlns:p="http://schemas.openxmlformats.org/presentationml/2006/main">
+  <p:cSld>
+    <p:spTree>
+      <p:nvGrpSpPr>
+        <p:cNvPr id="1" name=""/>
+        <p:cNvGrpSpPr/>
+        <p:nvPr/>
+      </p:nvGrpSpPr>
+      <p:grpSpPr>
+        <a:xfrm>
+          <a:off x="0" y="0"/>
+          <a:ext cx="0" cy="0"/>
+          <a:chOff x="0" y="0"/>
+          <a:chExt cx="0" cy="0"/>
+        </a:xfrm>
+      </p:grpSpPr>
+      <p:pic>
+        <p:nvPicPr>
+          <p:cNvPr id="5" name="그림 4">
+            <a:extLst>
+              <a:ext uri="{FF2B5EF4-FFF2-40B4-BE49-F238E27FC236}">
+                <a16:creationId xmlns:a16="http://schemas.microsoft.com/office/drawing/2014/main" id="{532638B7-9F03-4BF3-98CC-AE7A06ADEB86}"/>
+              </a:ext>
+            </a:extLst>
+          </p:cNvPr>
+          <p:cNvPicPr>
+            <a:picLocks noChangeAspect="1"/>
+          </p:cNvPicPr>
+          <p:nvPr/>
+        </p:nvPicPr>
+        <p:blipFill rotWithShape="1">
+          <a:blip r:embed="rId2">
+            <a:extLst>
+              <a:ext uri="{28A0092B-C50C-407E-A947-70E740481C1C}">
+                <a14:useLocalDpi xmlns:a14="http://schemas.microsoft.com/office/drawing/2010/main" val="0"/>
+              </a:ext>
+            </a:extLst>
+          </a:blip>
+          <a:srcRect/>
+          <a:stretch/>
+        </p:blipFill>
+        <p:spPr>
+          <a:xfrm>
+            <a:off x="3504975" y="3428999"/>
+            <a:ext cx="2591023" cy="2591025"/>
+          </a:xfrm>
+          <a:prstGeom prst="rect">
+            <a:avLst/>
+          </a:prstGeom>
+        </p:spPr>
+      </p:pic>
+      <p:pic>
+        <p:nvPicPr>
+          <p:cNvPr id="7" name="그림 6">
+            <a:extLst>
+              <a:ext uri="{FF2B5EF4-FFF2-40B4-BE49-F238E27FC236}">
+                <a16:creationId xmlns:a16="http://schemas.microsoft.com/office/drawing/2014/main" id="{8976FE2A-D843-48E3-91A0-505DEE787EEF}"/>
+              </a:ext>
+            </a:extLst>
+          </p:cNvPr>
+          <p:cNvPicPr>
+            <a:picLocks noChangeAspect="1"/>
+          </p:cNvPicPr>
+          <p:nvPr/>
+        </p:nvPicPr>
+        <p:blipFill rotWithShape="1">
+          <a:blip r:embed="rId3">
+            <a:extLst>
+              <a:ext uri="{28A0092B-C50C-407E-A947-70E740481C1C}">
+                <a14:useLocalDpi xmlns:a14="http://schemas.microsoft.com/office/drawing/2010/main" val="0"/>
+              </a:ext>
+            </a:extLst>
+          </a:blip>
+          <a:srcRect/>
+          <a:stretch/>
+        </p:blipFill>
+        <p:spPr>
+          <a:xfrm>
+            <a:off x="6095999" y="3428999"/>
+            <a:ext cx="2591025" cy="2591025"/>
+          </a:xfrm>
+          <a:prstGeom prst="rect">
+            <a:avLst/>
+          </a:prstGeom>
+        </p:spPr>
+      </p:pic>
+      <p:pic>
+        <p:nvPicPr>
+          <p:cNvPr id="9" name="그림 8">
+            <a:extLst>
+              <a:ext uri="{FF2B5EF4-FFF2-40B4-BE49-F238E27FC236}">
+                <a16:creationId xmlns:a16="http://schemas.microsoft.com/office/drawing/2014/main" id="{628C8E31-8BE5-4B72-9D96-7AB73A44989F}"/>
+              </a:ext>
+            </a:extLst>
+          </p:cNvPr>
+          <p:cNvPicPr>
+            <a:picLocks noChangeAspect="1"/>
+          </p:cNvPicPr>
+          <p:nvPr/>
+        </p:nvPicPr>
+        <p:blipFill rotWithShape="1">
+          <a:blip r:embed="rId4">
+            <a:extLst>
+              <a:ext uri="{28A0092B-C50C-407E-A947-70E740481C1C}">
+                <a14:useLocalDpi xmlns:a14="http://schemas.microsoft.com/office/drawing/2010/main" val="0"/>
+              </a:ext>
+            </a:extLst>
+          </a:blip>
+          <a:srcRect/>
+          <a:stretch/>
+        </p:blipFill>
+        <p:spPr>
+          <a:xfrm>
+            <a:off x="3504975" y="837975"/>
+            <a:ext cx="2591025" cy="2591025"/>
+          </a:xfrm>
+          <a:prstGeom prst="rect">
+            <a:avLst/>
+          </a:prstGeom>
+        </p:spPr>
+      </p:pic>
+      <p:pic>
+        <p:nvPicPr>
+          <p:cNvPr id="11" name="그림 10">
+            <a:extLst>
+              <a:ext uri="{FF2B5EF4-FFF2-40B4-BE49-F238E27FC236}">
+                <a16:creationId xmlns:a16="http://schemas.microsoft.com/office/drawing/2014/main" id="{7D572E20-4CEB-4A76-99E0-FBB89B3CBEEC}"/>
+              </a:ext>
+            </a:extLst>
+          </p:cNvPr>
+          <p:cNvPicPr>
+            <a:picLocks noChangeAspect="1"/>
+          </p:cNvPicPr>
+          <p:nvPr/>
+        </p:nvPicPr>
+        <p:blipFill rotWithShape="1">
+          <a:blip r:embed="rId5">
+            <a:extLst>
+              <a:ext uri="{28A0092B-C50C-407E-A947-70E740481C1C}">
+                <a14:useLocalDpi xmlns:a14="http://schemas.microsoft.com/office/drawing/2010/main" val="0"/>
+              </a:ext>
+            </a:extLst>
+          </a:blip>
+          <a:srcRect/>
+          <a:stretch/>
+        </p:blipFill>
+        <p:spPr>
+          <a:xfrm>
+            <a:off x="6096000" y="837975"/>
+            <a:ext cx="2591024" cy="2591025"/>
+          </a:xfrm>
+          <a:prstGeom prst="rect">
+            <a:avLst/>
+          </a:prstGeom>
+        </p:spPr>
+      </p:pic>
+    </p:spTree>
+    <p:extLst>
+      <p:ext uri="{BB962C8B-B14F-4D97-AF65-F5344CB8AC3E}">
+        <p14:creationId xmlns:p14="http://schemas.microsoft.com/office/powerpoint/2010/main" val="1130417513"/>
+      </p:ext>
+    </p:extLst>
+  </p:cSld>
+  <p:clrMapOvr>
+    <a:masterClrMapping/>
+  </p:clrMapOvr>
+</p:sld>
+</file>
+
 <file path=ppt/theme/theme1.xml><?xml version="1.0" encoding="utf-8"?>
 <a:theme xmlns:a="http://schemas.openxmlformats.org/drawingml/2006/main" name="Office 테마">
   <a:themeElements>

</xml_diff>

<commit_message>
changed day/night button to image
</commit_message>
<xml_diff>
--- a/images/design.pptx
+++ b/images/design.pptx
@@ -209,7 +209,7 @@
           <a:p>
             <a:fld id="{4C20BAA2-BD9B-485A-B03A-9B705EBC1C18}" type="datetimeFigureOut">
               <a:rPr lang="ko-KR" altLang="en-US" smtClean="0"/>
-              <a:t>2021-11-26</a:t>
+              <a:t>2021-12-04</a:t>
             </a:fld>
             <a:endParaRPr lang="ko-KR" altLang="en-US"/>
           </a:p>
@@ -707,7 +707,7 @@
           <a:p>
             <a:fld id="{C9C1371F-EFFD-428B-A2B4-E353846D2DA0}" type="datetimeFigureOut">
               <a:rPr lang="ko-KR" altLang="en-US" smtClean="0"/>
-              <a:t>2021-11-26</a:t>
+              <a:t>2021-12-04</a:t>
             </a:fld>
             <a:endParaRPr lang="ko-KR" altLang="en-US"/>
           </a:p>
@@ -905,7 +905,7 @@
           <a:p>
             <a:fld id="{C9C1371F-EFFD-428B-A2B4-E353846D2DA0}" type="datetimeFigureOut">
               <a:rPr lang="ko-KR" altLang="en-US" smtClean="0"/>
-              <a:t>2021-11-26</a:t>
+              <a:t>2021-12-04</a:t>
             </a:fld>
             <a:endParaRPr lang="ko-KR" altLang="en-US"/>
           </a:p>
@@ -1113,7 +1113,7 @@
           <a:p>
             <a:fld id="{C9C1371F-EFFD-428B-A2B4-E353846D2DA0}" type="datetimeFigureOut">
               <a:rPr lang="ko-KR" altLang="en-US" smtClean="0"/>
-              <a:t>2021-11-26</a:t>
+              <a:t>2021-12-04</a:t>
             </a:fld>
             <a:endParaRPr lang="ko-KR" altLang="en-US"/>
           </a:p>
@@ -1311,7 +1311,7 @@
           <a:p>
             <a:fld id="{C9C1371F-EFFD-428B-A2B4-E353846D2DA0}" type="datetimeFigureOut">
               <a:rPr lang="ko-KR" altLang="en-US" smtClean="0"/>
-              <a:t>2021-11-26</a:t>
+              <a:t>2021-12-04</a:t>
             </a:fld>
             <a:endParaRPr lang="ko-KR" altLang="en-US"/>
           </a:p>
@@ -1586,7 +1586,7 @@
           <a:p>
             <a:fld id="{C9C1371F-EFFD-428B-A2B4-E353846D2DA0}" type="datetimeFigureOut">
               <a:rPr lang="ko-KR" altLang="en-US" smtClean="0"/>
-              <a:t>2021-11-26</a:t>
+              <a:t>2021-12-04</a:t>
             </a:fld>
             <a:endParaRPr lang="ko-KR" altLang="en-US"/>
           </a:p>
@@ -1851,7 +1851,7 @@
           <a:p>
             <a:fld id="{C9C1371F-EFFD-428B-A2B4-E353846D2DA0}" type="datetimeFigureOut">
               <a:rPr lang="ko-KR" altLang="en-US" smtClean="0"/>
-              <a:t>2021-11-26</a:t>
+              <a:t>2021-12-04</a:t>
             </a:fld>
             <a:endParaRPr lang="ko-KR" altLang="en-US"/>
           </a:p>
@@ -2263,7 +2263,7 @@
           <a:p>
             <a:fld id="{C9C1371F-EFFD-428B-A2B4-E353846D2DA0}" type="datetimeFigureOut">
               <a:rPr lang="ko-KR" altLang="en-US" smtClean="0"/>
-              <a:t>2021-11-26</a:t>
+              <a:t>2021-12-04</a:t>
             </a:fld>
             <a:endParaRPr lang="ko-KR" altLang="en-US"/>
           </a:p>
@@ -2404,7 +2404,7 @@
           <a:p>
             <a:fld id="{C9C1371F-EFFD-428B-A2B4-E353846D2DA0}" type="datetimeFigureOut">
               <a:rPr lang="ko-KR" altLang="en-US" smtClean="0"/>
-              <a:t>2021-11-26</a:t>
+              <a:t>2021-12-04</a:t>
             </a:fld>
             <a:endParaRPr lang="ko-KR" altLang="en-US"/>
           </a:p>
@@ -2517,7 +2517,7 @@
           <a:p>
             <a:fld id="{C9C1371F-EFFD-428B-A2B4-E353846D2DA0}" type="datetimeFigureOut">
               <a:rPr lang="ko-KR" altLang="en-US" smtClean="0"/>
-              <a:t>2021-11-26</a:t>
+              <a:t>2021-12-04</a:t>
             </a:fld>
             <a:endParaRPr lang="ko-KR" altLang="en-US"/>
           </a:p>
@@ -2828,7 +2828,7 @@
           <a:p>
             <a:fld id="{C9C1371F-EFFD-428B-A2B4-E353846D2DA0}" type="datetimeFigureOut">
               <a:rPr lang="ko-KR" altLang="en-US" smtClean="0"/>
-              <a:t>2021-11-26</a:t>
+              <a:t>2021-12-04</a:t>
             </a:fld>
             <a:endParaRPr lang="ko-KR" altLang="en-US"/>
           </a:p>
@@ -3116,7 +3116,7 @@
           <a:p>
             <a:fld id="{C9C1371F-EFFD-428B-A2B4-E353846D2DA0}" type="datetimeFigureOut">
               <a:rPr lang="ko-KR" altLang="en-US" smtClean="0"/>
-              <a:t>2021-11-26</a:t>
+              <a:t>2021-12-04</a:t>
             </a:fld>
             <a:endParaRPr lang="ko-KR" altLang="en-US"/>
           </a:p>
@@ -3357,7 +3357,7 @@
           <a:p>
             <a:fld id="{C9C1371F-EFFD-428B-A2B4-E353846D2DA0}" type="datetimeFigureOut">
               <a:rPr lang="ko-KR" altLang="en-US" smtClean="0"/>
-              <a:t>2021-11-26</a:t>
+              <a:t>2021-12-04</a:t>
             </a:fld>
             <a:endParaRPr lang="ko-KR" altLang="en-US"/>
           </a:p>
@@ -12721,196 +12721,10 @@
       </p:grpSpPr>
       <p:sp>
         <p:nvSpPr>
-          <p:cNvPr id="4" name="타원 3">
+          <p:cNvPr id="5" name="직사각형 4">
             <a:extLst>
               <a:ext uri="{FF2B5EF4-FFF2-40B4-BE49-F238E27FC236}">
-                <a16:creationId xmlns:a16="http://schemas.microsoft.com/office/drawing/2014/main" id="{36259BB6-0F5A-44DA-B90B-94DD5DDCA238}"/>
-              </a:ext>
-            </a:extLst>
-          </p:cNvPr>
-          <p:cNvSpPr/>
-          <p:nvPr/>
-        </p:nvSpPr>
-        <p:spPr>
-          <a:xfrm>
-            <a:off x="2856000" y="189000"/>
-            <a:ext cx="6480000" cy="6480000"/>
-          </a:xfrm>
-          <a:prstGeom prst="ellipse">
-            <a:avLst/>
-          </a:prstGeom>
-          <a:solidFill>
-            <a:schemeClr val="tx1"/>
-          </a:solidFill>
-          <a:ln w="76200">
-            <a:noFill/>
-          </a:ln>
-        </p:spPr>
-        <p:style>
-          <a:lnRef idx="2">
-            <a:schemeClr val="accent1">
-              <a:shade val="50000"/>
-            </a:schemeClr>
-          </a:lnRef>
-          <a:fillRef idx="1">
-            <a:schemeClr val="accent1"/>
-          </a:fillRef>
-          <a:effectRef idx="0">
-            <a:schemeClr val="accent1"/>
-          </a:effectRef>
-          <a:fontRef idx="minor">
-            <a:schemeClr val="lt1"/>
-          </a:fontRef>
-        </p:style>
-        <p:txBody>
-          <a:bodyPr rtlCol="0" anchor="ctr"/>
-          <a:lstStyle/>
-          <a:p>
-            <a:pPr algn="ctr"/>
-            <a:endParaRPr lang="ko-KR" altLang="en-US" dirty="0"/>
-          </a:p>
-        </p:txBody>
-      </p:sp>
-      <p:sp>
-        <p:nvSpPr>
-          <p:cNvPr id="6" name="별: 꼭짓점 8개 5">
-            <a:extLst>
-              <a:ext uri="{FF2B5EF4-FFF2-40B4-BE49-F238E27FC236}">
-                <a16:creationId xmlns:a16="http://schemas.microsoft.com/office/drawing/2014/main" id="{B054DCC5-9D97-4F2F-93D0-F00B523BBB3B}"/>
-              </a:ext>
-            </a:extLst>
-          </p:cNvPr>
-          <p:cNvSpPr/>
-          <p:nvPr/>
-        </p:nvSpPr>
-        <p:spPr>
-          <a:xfrm>
-            <a:off x="3135984" y="468984"/>
-            <a:ext cx="5920033" cy="5920033"/>
-          </a:xfrm>
-          <a:prstGeom prst="star8">
-            <a:avLst/>
-          </a:prstGeom>
-          <a:solidFill>
-            <a:schemeClr val="bg1"/>
-          </a:solidFill>
-          <a:ln>
-            <a:noFill/>
-          </a:ln>
-        </p:spPr>
-        <p:style>
-          <a:lnRef idx="2">
-            <a:schemeClr val="accent1">
-              <a:shade val="50000"/>
-            </a:schemeClr>
-          </a:lnRef>
-          <a:fillRef idx="1">
-            <a:schemeClr val="accent1"/>
-          </a:fillRef>
-          <a:effectRef idx="0">
-            <a:schemeClr val="accent1"/>
-          </a:effectRef>
-          <a:fontRef idx="minor">
-            <a:schemeClr val="lt1"/>
-          </a:fontRef>
-        </p:style>
-        <p:txBody>
-          <a:bodyPr rtlCol="0" anchor="ctr"/>
-          <a:lstStyle/>
-          <a:p>
-            <a:pPr algn="ctr"/>
-            <a:endParaRPr lang="ko-KR" altLang="en-US" dirty="0"/>
-          </a:p>
-        </p:txBody>
-      </p:sp>
-      <p:sp>
-        <p:nvSpPr>
-          <p:cNvPr id="8" name="타원 7">
-            <a:extLst>
-              <a:ext uri="{FF2B5EF4-FFF2-40B4-BE49-F238E27FC236}">
-                <a16:creationId xmlns:a16="http://schemas.microsoft.com/office/drawing/2014/main" id="{FC721A4B-8A0D-46FF-A41A-8ADD4F8FA25C}"/>
-              </a:ext>
-            </a:extLst>
-          </p:cNvPr>
-          <p:cNvSpPr/>
-          <p:nvPr/>
-        </p:nvSpPr>
-        <p:spPr>
-          <a:xfrm>
-            <a:off x="4835652" y="2168652"/>
-            <a:ext cx="2520696" cy="2520696"/>
-          </a:xfrm>
-          <a:prstGeom prst="ellipse">
-            <a:avLst/>
-          </a:prstGeom>
-          <a:solidFill>
-            <a:schemeClr val="tx1"/>
-          </a:solidFill>
-          <a:ln>
-            <a:noFill/>
-          </a:ln>
-        </p:spPr>
-        <p:style>
-          <a:lnRef idx="2">
-            <a:schemeClr val="accent1">
-              <a:shade val="50000"/>
-            </a:schemeClr>
-          </a:lnRef>
-          <a:fillRef idx="1">
-            <a:schemeClr val="accent1"/>
-          </a:fillRef>
-          <a:effectRef idx="0">
-            <a:schemeClr val="accent1"/>
-          </a:effectRef>
-          <a:fontRef idx="minor">
-            <a:schemeClr val="lt1"/>
-          </a:fontRef>
-        </p:style>
-        <p:txBody>
-          <a:bodyPr rtlCol="0" anchor="ctr"/>
-          <a:lstStyle/>
-          <a:p>
-            <a:pPr algn="ctr"/>
-            <a:endParaRPr lang="ko-KR" altLang="en-US" dirty="0"/>
-          </a:p>
-        </p:txBody>
-      </p:sp>
-    </p:spTree>
-    <p:extLst>
-      <p:ext uri="{BB962C8B-B14F-4D97-AF65-F5344CB8AC3E}">
-        <p14:creationId xmlns:p14="http://schemas.microsoft.com/office/powerpoint/2010/main" val="2619039556"/>
-      </p:ext>
-    </p:extLst>
-  </p:cSld>
-  <p:clrMapOvr>
-    <a:masterClrMapping/>
-  </p:clrMapOvr>
-</p:sld>
-</file>
-
-<file path=ppt/slides/slide13.xml><?xml version="1.0" encoding="utf-8"?>
-<p:sld xmlns:a="http://schemas.openxmlformats.org/drawingml/2006/main" xmlns:r="http://schemas.openxmlformats.org/officeDocument/2006/relationships" xmlns:p="http://schemas.openxmlformats.org/presentationml/2006/main">
-  <p:cSld>
-    <p:spTree>
-      <p:nvGrpSpPr>
-        <p:cNvPr id="1" name=""/>
-        <p:cNvGrpSpPr/>
-        <p:nvPr/>
-      </p:nvGrpSpPr>
-      <p:grpSpPr>
-        <a:xfrm>
-          <a:off x="0" y="0"/>
-          <a:ext cx="0" cy="0"/>
-          <a:chOff x="0" y="0"/>
-          <a:chExt cx="0" cy="0"/>
-        </a:xfrm>
-      </p:grpSpPr>
-      <p:sp>
-        <p:nvSpPr>
-          <p:cNvPr id="2" name="직사각형 1">
-            <a:extLst>
-              <a:ext uri="{FF2B5EF4-FFF2-40B4-BE49-F238E27FC236}">
-                <a16:creationId xmlns:a16="http://schemas.microsoft.com/office/drawing/2014/main" id="{657A4E58-AD9D-4015-A188-4D7FCDD0FF5F}"/>
+                <a16:creationId xmlns:a16="http://schemas.microsoft.com/office/drawing/2014/main" id="{55F4531F-0CD0-459C-899B-A66F5EEDFC7E}"/>
               </a:ext>
             </a:extLst>
           </p:cNvPr>
@@ -13011,6 +12825,192 @@
       </p:sp>
       <p:sp>
         <p:nvSpPr>
+          <p:cNvPr id="6" name="별: 꼭짓점 8개 5">
+            <a:extLst>
+              <a:ext uri="{FF2B5EF4-FFF2-40B4-BE49-F238E27FC236}">
+                <a16:creationId xmlns:a16="http://schemas.microsoft.com/office/drawing/2014/main" id="{B054DCC5-9D97-4F2F-93D0-F00B523BBB3B}"/>
+              </a:ext>
+            </a:extLst>
+          </p:cNvPr>
+          <p:cNvSpPr/>
+          <p:nvPr/>
+        </p:nvSpPr>
+        <p:spPr>
+          <a:xfrm>
+            <a:off x="3135984" y="468984"/>
+            <a:ext cx="5920033" cy="5920033"/>
+          </a:xfrm>
+          <a:prstGeom prst="star8">
+            <a:avLst/>
+          </a:prstGeom>
+          <a:solidFill>
+            <a:schemeClr val="tx1"/>
+          </a:solidFill>
+          <a:ln>
+            <a:noFill/>
+          </a:ln>
+        </p:spPr>
+        <p:style>
+          <a:lnRef idx="2">
+            <a:schemeClr val="accent1">
+              <a:shade val="50000"/>
+            </a:schemeClr>
+          </a:lnRef>
+          <a:fillRef idx="1">
+            <a:schemeClr val="accent1"/>
+          </a:fillRef>
+          <a:effectRef idx="0">
+            <a:schemeClr val="accent1"/>
+          </a:effectRef>
+          <a:fontRef idx="minor">
+            <a:schemeClr val="lt1"/>
+          </a:fontRef>
+        </p:style>
+        <p:txBody>
+          <a:bodyPr rtlCol="0" anchor="ctr"/>
+          <a:lstStyle/>
+          <a:p>
+            <a:pPr algn="ctr"/>
+            <a:endParaRPr lang="ko-KR" altLang="en-US" dirty="0"/>
+          </a:p>
+        </p:txBody>
+      </p:sp>
+      <p:sp>
+        <p:nvSpPr>
+          <p:cNvPr id="8" name="타원 7">
+            <a:extLst>
+              <a:ext uri="{FF2B5EF4-FFF2-40B4-BE49-F238E27FC236}">
+                <a16:creationId xmlns:a16="http://schemas.microsoft.com/office/drawing/2014/main" id="{FC721A4B-8A0D-46FF-A41A-8ADD4F8FA25C}"/>
+              </a:ext>
+            </a:extLst>
+          </p:cNvPr>
+          <p:cNvSpPr/>
+          <p:nvPr/>
+        </p:nvSpPr>
+        <p:spPr>
+          <a:xfrm>
+            <a:off x="4835652" y="2168652"/>
+            <a:ext cx="2520696" cy="2520696"/>
+          </a:xfrm>
+          <a:prstGeom prst="ellipse">
+            <a:avLst/>
+          </a:prstGeom>
+          <a:solidFill>
+            <a:schemeClr val="bg1"/>
+          </a:solidFill>
+          <a:ln>
+            <a:noFill/>
+          </a:ln>
+        </p:spPr>
+        <p:style>
+          <a:lnRef idx="2">
+            <a:schemeClr val="accent1">
+              <a:shade val="50000"/>
+            </a:schemeClr>
+          </a:lnRef>
+          <a:fillRef idx="1">
+            <a:schemeClr val="accent1"/>
+          </a:fillRef>
+          <a:effectRef idx="0">
+            <a:schemeClr val="accent1"/>
+          </a:effectRef>
+          <a:fontRef idx="minor">
+            <a:schemeClr val="lt1"/>
+          </a:fontRef>
+        </p:style>
+        <p:txBody>
+          <a:bodyPr rtlCol="0" anchor="ctr"/>
+          <a:lstStyle/>
+          <a:p>
+            <a:pPr algn="ctr"/>
+            <a:endParaRPr lang="ko-KR" altLang="en-US" dirty="0"/>
+          </a:p>
+        </p:txBody>
+      </p:sp>
+    </p:spTree>
+    <p:extLst>
+      <p:ext uri="{BB962C8B-B14F-4D97-AF65-F5344CB8AC3E}">
+        <p14:creationId xmlns:p14="http://schemas.microsoft.com/office/powerpoint/2010/main" val="2619039556"/>
+      </p:ext>
+    </p:extLst>
+  </p:cSld>
+  <p:clrMapOvr>
+    <a:masterClrMapping/>
+  </p:clrMapOvr>
+</p:sld>
+</file>
+
+<file path=ppt/slides/slide13.xml><?xml version="1.0" encoding="utf-8"?>
+<p:sld xmlns:a="http://schemas.openxmlformats.org/drawingml/2006/main" xmlns:r="http://schemas.openxmlformats.org/officeDocument/2006/relationships" xmlns:p="http://schemas.openxmlformats.org/presentationml/2006/main">
+  <p:cSld>
+    <p:spTree>
+      <p:nvGrpSpPr>
+        <p:cNvPr id="1" name=""/>
+        <p:cNvGrpSpPr/>
+        <p:nvPr/>
+      </p:nvGrpSpPr>
+      <p:grpSpPr>
+        <a:xfrm>
+          <a:off x="0" y="0"/>
+          <a:ext cx="0" cy="0"/>
+          <a:chOff x="0" y="0"/>
+          <a:chExt cx="0" cy="0"/>
+        </a:xfrm>
+      </p:grpSpPr>
+      <p:sp>
+        <p:nvSpPr>
+          <p:cNvPr id="4" name="타원 3">
+            <a:extLst>
+              <a:ext uri="{FF2B5EF4-FFF2-40B4-BE49-F238E27FC236}">
+                <a16:creationId xmlns:a16="http://schemas.microsoft.com/office/drawing/2014/main" id="{36259BB6-0F5A-44DA-B90B-94DD5DDCA238}"/>
+              </a:ext>
+            </a:extLst>
+          </p:cNvPr>
+          <p:cNvSpPr/>
+          <p:nvPr/>
+        </p:nvSpPr>
+        <p:spPr>
+          <a:xfrm>
+            <a:off x="2856000" y="189000"/>
+            <a:ext cx="6480000" cy="6480000"/>
+          </a:xfrm>
+          <a:prstGeom prst="ellipse">
+            <a:avLst/>
+          </a:prstGeom>
+          <a:solidFill>
+            <a:schemeClr val="tx1"/>
+          </a:solidFill>
+          <a:ln w="76200">
+            <a:noFill/>
+          </a:ln>
+        </p:spPr>
+        <p:style>
+          <a:lnRef idx="2">
+            <a:schemeClr val="accent1">
+              <a:shade val="50000"/>
+            </a:schemeClr>
+          </a:lnRef>
+          <a:fillRef idx="1">
+            <a:schemeClr val="accent1"/>
+          </a:fillRef>
+          <a:effectRef idx="0">
+            <a:schemeClr val="accent1"/>
+          </a:effectRef>
+          <a:fontRef idx="minor">
+            <a:schemeClr val="lt1"/>
+          </a:fontRef>
+        </p:style>
+        <p:txBody>
+          <a:bodyPr rtlCol="0" anchor="ctr"/>
+          <a:lstStyle/>
+          <a:p>
+            <a:pPr algn="ctr"/>
+            <a:endParaRPr lang="ko-KR" altLang="en-US" dirty="0"/>
+          </a:p>
+        </p:txBody>
+      </p:sp>
+      <p:sp>
+        <p:nvSpPr>
           <p:cNvPr id="7" name="원형: 비어 있음 6">
             <a:extLst>
               <a:ext uri="{FF2B5EF4-FFF2-40B4-BE49-F238E27FC236}">
@@ -13030,7 +13030,7 @@
             <a:avLst/>
           </a:prstGeom>
           <a:solidFill>
-            <a:schemeClr val="tx1"/>
+            <a:schemeClr val="bg1"/>
           </a:solidFill>
           <a:ln>
             <a:noFill/>
@@ -13086,7 +13086,7 @@
             <a:avLst/>
           </a:prstGeom>
           <a:solidFill>
-            <a:schemeClr val="bg1"/>
+            <a:schemeClr val="tx1"/>
           </a:solidFill>
           <a:ln>
             <a:noFill/>
@@ -13138,7 +13138,7 @@
             <a:avLst/>
           </a:prstGeom>
           <a:solidFill>
-            <a:schemeClr val="bg1"/>
+            <a:schemeClr val="tx1"/>
           </a:solidFill>
           <a:ln>
             <a:noFill/>
@@ -13190,7 +13190,7 @@
             <a:avLst/>
           </a:prstGeom>
           <a:solidFill>
-            <a:schemeClr val="bg1"/>
+            <a:schemeClr val="tx1"/>
           </a:solidFill>
           <a:ln>
             <a:noFill/>
@@ -13242,7 +13242,7 @@
             <a:avLst/>
           </a:prstGeom>
           <a:solidFill>
-            <a:schemeClr val="tx1"/>
+            <a:schemeClr val="bg1"/>
           </a:solidFill>
           <a:ln>
             <a:noFill/>

</xml_diff>